<commit_message>
Initialization of the SRS Document
</commit_message>
<xml_diff>
--- a/docs/SRS/SystemContextFigure.pptx
+++ b/docs/SRS/SystemContextFigure.pptx
@@ -304,7 +304,7 @@
           <a:p>
             <a:fld id="{779256A2-DE0C-7447-B687-786F38514E8C}" type="datetimeFigureOut">
               <a:rPr lang="en-US" smtClean="0"/>
-              <a:t>9/4/19</a:t>
+              <a:t>1/28/2026</a:t>
             </a:fld>
             <a:endParaRPr lang="en-US"/>
           </a:p>
@@ -474,7 +474,7 @@
           <a:p>
             <a:fld id="{779256A2-DE0C-7447-B687-786F38514E8C}" type="datetimeFigureOut">
               <a:rPr lang="en-US" smtClean="0"/>
-              <a:t>9/4/19</a:t>
+              <a:t>1/28/2026</a:t>
             </a:fld>
             <a:endParaRPr lang="en-US"/>
           </a:p>
@@ -654,7 +654,7 @@
           <a:p>
             <a:fld id="{779256A2-DE0C-7447-B687-786F38514E8C}" type="datetimeFigureOut">
               <a:rPr lang="en-US" smtClean="0"/>
-              <a:t>9/4/19</a:t>
+              <a:t>1/28/2026</a:t>
             </a:fld>
             <a:endParaRPr lang="en-US"/>
           </a:p>
@@ -824,7 +824,7 @@
           <a:p>
             <a:fld id="{779256A2-DE0C-7447-B687-786F38514E8C}" type="datetimeFigureOut">
               <a:rPr lang="en-US" smtClean="0"/>
-              <a:t>9/4/19</a:t>
+              <a:t>1/28/2026</a:t>
             </a:fld>
             <a:endParaRPr lang="en-US"/>
           </a:p>
@@ -1070,7 +1070,7 @@
           <a:p>
             <a:fld id="{779256A2-DE0C-7447-B687-786F38514E8C}" type="datetimeFigureOut">
               <a:rPr lang="en-US" smtClean="0"/>
-              <a:t>9/4/19</a:t>
+              <a:t>1/28/2026</a:t>
             </a:fld>
             <a:endParaRPr lang="en-US"/>
           </a:p>
@@ -1358,7 +1358,7 @@
           <a:p>
             <a:fld id="{779256A2-DE0C-7447-B687-786F38514E8C}" type="datetimeFigureOut">
               <a:rPr lang="en-US" smtClean="0"/>
-              <a:t>9/4/19</a:t>
+              <a:t>1/28/2026</a:t>
             </a:fld>
             <a:endParaRPr lang="en-US"/>
           </a:p>
@@ -1780,7 +1780,7 @@
           <a:p>
             <a:fld id="{779256A2-DE0C-7447-B687-786F38514E8C}" type="datetimeFigureOut">
               <a:rPr lang="en-US" smtClean="0"/>
-              <a:t>9/4/19</a:t>
+              <a:t>1/28/2026</a:t>
             </a:fld>
             <a:endParaRPr lang="en-US"/>
           </a:p>
@@ -1898,7 +1898,7 @@
           <a:p>
             <a:fld id="{779256A2-DE0C-7447-B687-786F38514E8C}" type="datetimeFigureOut">
               <a:rPr lang="en-US" smtClean="0"/>
-              <a:t>9/4/19</a:t>
+              <a:t>1/28/2026</a:t>
             </a:fld>
             <a:endParaRPr lang="en-US"/>
           </a:p>
@@ -1993,7 +1993,7 @@
           <a:p>
             <a:fld id="{779256A2-DE0C-7447-B687-786F38514E8C}" type="datetimeFigureOut">
               <a:rPr lang="en-US" smtClean="0"/>
-              <a:t>9/4/19</a:t>
+              <a:t>1/28/2026</a:t>
             </a:fld>
             <a:endParaRPr lang="en-US"/>
           </a:p>
@@ -2270,7 +2270,7 @@
           <a:p>
             <a:fld id="{779256A2-DE0C-7447-B687-786F38514E8C}" type="datetimeFigureOut">
               <a:rPr lang="en-US" smtClean="0"/>
-              <a:t>9/4/19</a:t>
+              <a:t>1/28/2026</a:t>
             </a:fld>
             <a:endParaRPr lang="en-US"/>
           </a:p>
@@ -2523,7 +2523,7 @@
           <a:p>
             <a:fld id="{779256A2-DE0C-7447-B687-786F38514E8C}" type="datetimeFigureOut">
               <a:rPr lang="en-US" smtClean="0"/>
-              <a:t>9/4/19</a:t>
+              <a:t>1/28/2026</a:t>
             </a:fld>
             <a:endParaRPr lang="en-US"/>
           </a:p>
@@ -2736,7 +2736,7 @@
           <a:p>
             <a:fld id="{779256A2-DE0C-7447-B687-786F38514E8C}" type="datetimeFigureOut">
               <a:rPr lang="en-US" smtClean="0"/>
-              <a:t>9/4/19</a:t>
+              <a:t>1/28/2026</a:t>
             </a:fld>
             <a:endParaRPr lang="en-US"/>
           </a:p>
@@ -3119,10 +3119,10 @@
         </p:nvGrpSpPr>
         <p:grpSpPr>
           <a:xfrm>
-            <a:off x="189913" y="2868373"/>
-            <a:ext cx="8858711" cy="1252941"/>
-            <a:chOff x="189913" y="3381165"/>
-            <a:chExt cx="8858711" cy="1252941"/>
+            <a:off x="189913" y="2653283"/>
+            <a:ext cx="8858711" cy="1468031"/>
+            <a:chOff x="189913" y="3166075"/>
+            <a:chExt cx="8858711" cy="1468031"/>
           </a:xfrm>
         </p:grpSpPr>
         <p:grpSp>
@@ -3333,9 +3333,9 @@
           <p:grpSpPr>
             <a:xfrm>
               <a:off x="3885481" y="3381165"/>
-              <a:ext cx="1523744" cy="1246370"/>
+              <a:ext cx="1483694" cy="1246370"/>
               <a:chOff x="3703297" y="1721177"/>
-              <a:chExt cx="1523744" cy="1246370"/>
+              <a:chExt cx="1483694" cy="1246370"/>
             </a:xfrm>
           </p:grpSpPr>
           <p:sp>
@@ -3394,8 +3394,8 @@
             </p:nvSpPr>
             <p:spPr>
               <a:xfrm>
-                <a:off x="3726309" y="2113529"/>
-                <a:ext cx="1500732" cy="461665"/>
+                <a:off x="3726309" y="1935434"/>
+                <a:ext cx="1396536" cy="830997"/>
               </a:xfrm>
               <a:prstGeom prst="rect">
                 <a:avLst/>
@@ -3409,16 +3409,21 @@
               <a:lstStyle/>
               <a:p>
                 <a:r>
-                  <a:rPr lang="en-US" sz="2400" dirty="0" err="1">
+                  <a:rPr lang="en-US" sz="2400" dirty="0">
                     <a:latin typeface="Times New Roman"/>
                     <a:cs typeface="Times New Roman"/>
                   </a:rPr>
-                  <a:t>ProgName</a:t>
+                  <a:t>Flocking</a:t>
                 </a:r>
-                <a:endParaRPr lang="en-US" sz="2400" dirty="0">
-                  <a:latin typeface="Times New Roman"/>
-                  <a:cs typeface="Times New Roman"/>
-                </a:endParaRPr>
+              </a:p>
+              <a:p>
+                <a:r>
+                  <a:rPr lang="en-US" sz="2400" dirty="0">
+                    <a:latin typeface="Times New Roman"/>
+                    <a:cs typeface="Times New Roman"/>
+                  </a:rPr>
+                  <a:t>Simulator</a:t>
+                </a:r>
               </a:p>
             </p:txBody>
           </p:sp>
@@ -3508,8 +3513,8 @@
           </p:nvSpPr>
           <p:spPr>
             <a:xfrm>
-              <a:off x="1745191" y="3577615"/>
-              <a:ext cx="1114408" cy="369332"/>
+              <a:off x="1422181" y="3166075"/>
+              <a:ext cx="2539478" cy="830997"/>
             </a:xfrm>
             <a:prstGeom prst="rect">
               <a:avLst/>
@@ -3523,11 +3528,29 @@
             <a:lstStyle/>
             <a:p>
               <a:r>
-                <a:rPr lang="en-US" dirty="0">
+                <a:rPr lang="en-US" sz="1600" dirty="0">
                   <a:latin typeface="Times New Roman"/>
                   <a:cs typeface="Times New Roman"/>
                 </a:rPr>
-                <a:t>Inputs: …</a:t>
+                <a:t>Flocking model parameters, </a:t>
+              </a:r>
+            </a:p>
+            <a:p>
+              <a:r>
+                <a:rPr lang="en-US" sz="1600" dirty="0">
+                  <a:latin typeface="Times New Roman"/>
+                  <a:cs typeface="Times New Roman"/>
+                </a:rPr>
+                <a:t>obstacle distribution,</a:t>
+              </a:r>
+            </a:p>
+            <a:p>
+              <a:r>
+                <a:rPr lang="en-US" sz="1600" dirty="0">
+                  <a:latin typeface="Times New Roman"/>
+                  <a:cs typeface="Times New Roman"/>
+                </a:rPr>
+                <a:t>integration method</a:t>
               </a:r>
             </a:p>
           </p:txBody>
@@ -3540,8 +3563,8 @@
           </p:nvSpPr>
           <p:spPr>
             <a:xfrm>
-              <a:off x="5369175" y="3577615"/>
-              <a:ext cx="1268296" cy="369332"/>
+              <a:off x="5551963" y="3357017"/>
+              <a:ext cx="1745991" cy="584775"/>
             </a:xfrm>
             <a:prstGeom prst="rect">
               <a:avLst/>
@@ -3555,11 +3578,20 @@
             <a:lstStyle/>
             <a:p>
               <a:r>
-                <a:rPr lang="en-US" dirty="0">
+                <a:rPr lang="en-US" sz="1600" dirty="0">
                   <a:latin typeface="Times New Roman"/>
                   <a:cs typeface="Times New Roman"/>
                 </a:rPr>
-                <a:t>Outputs: …</a:t>
+                <a:t>Flocking states, </a:t>
+              </a:r>
+            </a:p>
+            <a:p>
+              <a:r>
+                <a:rPr lang="en-US" sz="1600" dirty="0">
+                  <a:latin typeface="Times New Roman"/>
+                  <a:cs typeface="Times New Roman"/>
+                </a:rPr>
+                <a:t>flocking animation</a:t>
               </a:r>
             </a:p>
           </p:txBody>

</xml_diff>